<commit_message>
k7 progression | artiste&album
</commit_message>
<xml_diff>
--- a/Assets/Nouveau Présentation Microsoft PowerPoint.pptx
+++ b/Assets/Nouveau Présentation Microsoft PowerPoint.pptx
@@ -104,6 +104,11 @@
       </a:defRPr>
     </a:lvl9pPr>
   </p:defaultTextStyle>
+  <p:extLst>
+    <p:ext uri="{EFAFB233-063F-42B5-8137-9DF3F51BA10A}">
+      <p15:sldGuideLst xmlns:p15="http://schemas.microsoft.com/office/powerpoint/2012/main"/>
+    </p:ext>
+  </p:extLst>
 </p:presentation>
 </file>
 
@@ -149,10 +154,9 @@
           </a:lstStyle>
           <a:p>
             <a:r>
-              <a:rPr lang="fr-FR" smtClean="0"/>
+              <a:rPr lang="fr-FR"/>
               <a:t>Modifiez le style du titre</a:t>
             </a:r>
-            <a:endParaRPr lang="fr-FR"/>
           </a:p>
         </p:txBody>
       </p:sp>
@@ -214,10 +218,9 @@
           </a:lstStyle>
           <a:p>
             <a:r>
-              <a:rPr lang="fr-FR" smtClean="0"/>
+              <a:rPr lang="fr-FR"/>
               <a:t>Modifier le style des sous-titres du masque</a:t>
             </a:r>
-            <a:endParaRPr lang="fr-FR"/>
           </a:p>
         </p:txBody>
       </p:sp>
@@ -332,10 +335,9 @@
           <a:lstStyle/>
           <a:p>
             <a:r>
-              <a:rPr lang="fr-FR" smtClean="0"/>
+              <a:rPr lang="fr-FR"/>
               <a:t>Modifiez le style du titre</a:t>
             </a:r>
-            <a:endParaRPr lang="fr-FR"/>
           </a:p>
         </p:txBody>
       </p:sp>
@@ -356,38 +358,37 @@
           <a:p>
             <a:pPr lvl="0"/>
             <a:r>
-              <a:rPr lang="fr-FR" smtClean="0"/>
+              <a:rPr lang="fr-FR"/>
               <a:t>Modifier les styles du texte du masque</a:t>
             </a:r>
           </a:p>
           <a:p>
             <a:pPr lvl="1"/>
             <a:r>
-              <a:rPr lang="fr-FR" smtClean="0"/>
+              <a:rPr lang="fr-FR"/>
               <a:t>Deuxième niveau</a:t>
             </a:r>
           </a:p>
           <a:p>
             <a:pPr lvl="2"/>
             <a:r>
-              <a:rPr lang="fr-FR" smtClean="0"/>
+              <a:rPr lang="fr-FR"/>
               <a:t>Troisième niveau</a:t>
             </a:r>
           </a:p>
           <a:p>
             <a:pPr lvl="3"/>
             <a:r>
-              <a:rPr lang="fr-FR" smtClean="0"/>
+              <a:rPr lang="fr-FR"/>
               <a:t>Quatrième niveau</a:t>
             </a:r>
           </a:p>
           <a:p>
             <a:pPr lvl="4"/>
             <a:r>
-              <a:rPr lang="fr-FR" smtClean="0"/>
+              <a:rPr lang="fr-FR"/>
               <a:t>Cinquième niveau</a:t>
             </a:r>
-            <a:endParaRPr lang="fr-FR"/>
           </a:p>
         </p:txBody>
       </p:sp>
@@ -507,10 +508,9 @@
           <a:lstStyle/>
           <a:p>
             <a:r>
-              <a:rPr lang="fr-FR" smtClean="0"/>
+              <a:rPr lang="fr-FR"/>
               <a:t>Modifiez le style du titre</a:t>
             </a:r>
-            <a:endParaRPr lang="fr-FR"/>
           </a:p>
         </p:txBody>
       </p:sp>
@@ -536,38 +536,37 @@
           <a:p>
             <a:pPr lvl="0"/>
             <a:r>
-              <a:rPr lang="fr-FR" smtClean="0"/>
+              <a:rPr lang="fr-FR"/>
               <a:t>Modifier les styles du texte du masque</a:t>
             </a:r>
           </a:p>
           <a:p>
             <a:pPr lvl="1"/>
             <a:r>
-              <a:rPr lang="fr-FR" smtClean="0"/>
+              <a:rPr lang="fr-FR"/>
               <a:t>Deuxième niveau</a:t>
             </a:r>
           </a:p>
           <a:p>
             <a:pPr lvl="2"/>
             <a:r>
-              <a:rPr lang="fr-FR" smtClean="0"/>
+              <a:rPr lang="fr-FR"/>
               <a:t>Troisième niveau</a:t>
             </a:r>
           </a:p>
           <a:p>
             <a:pPr lvl="3"/>
             <a:r>
-              <a:rPr lang="fr-FR" smtClean="0"/>
+              <a:rPr lang="fr-FR"/>
               <a:t>Quatrième niveau</a:t>
             </a:r>
           </a:p>
           <a:p>
             <a:pPr lvl="4"/>
             <a:r>
-              <a:rPr lang="fr-FR" smtClean="0"/>
+              <a:rPr lang="fr-FR"/>
               <a:t>Cinquième niveau</a:t>
             </a:r>
-            <a:endParaRPr lang="fr-FR"/>
           </a:p>
         </p:txBody>
       </p:sp>
@@ -682,10 +681,9 @@
           <a:lstStyle/>
           <a:p>
             <a:r>
-              <a:rPr lang="fr-FR" smtClean="0"/>
+              <a:rPr lang="fr-FR"/>
               <a:t>Modifiez le style du titre</a:t>
             </a:r>
-            <a:endParaRPr lang="fr-FR"/>
           </a:p>
         </p:txBody>
       </p:sp>
@@ -706,38 +704,37 @@
           <a:p>
             <a:pPr lvl="0"/>
             <a:r>
-              <a:rPr lang="fr-FR" smtClean="0"/>
+              <a:rPr lang="fr-FR"/>
               <a:t>Modifier les styles du texte du masque</a:t>
             </a:r>
           </a:p>
           <a:p>
             <a:pPr lvl="1"/>
             <a:r>
-              <a:rPr lang="fr-FR" smtClean="0"/>
+              <a:rPr lang="fr-FR"/>
               <a:t>Deuxième niveau</a:t>
             </a:r>
           </a:p>
           <a:p>
             <a:pPr lvl="2"/>
             <a:r>
-              <a:rPr lang="fr-FR" smtClean="0"/>
+              <a:rPr lang="fr-FR"/>
               <a:t>Troisième niveau</a:t>
             </a:r>
           </a:p>
           <a:p>
             <a:pPr lvl="3"/>
             <a:r>
-              <a:rPr lang="fr-FR" smtClean="0"/>
+              <a:rPr lang="fr-FR"/>
               <a:t>Quatrième niveau</a:t>
             </a:r>
           </a:p>
           <a:p>
             <a:pPr lvl="4"/>
             <a:r>
-              <a:rPr lang="fr-FR" smtClean="0"/>
+              <a:rPr lang="fr-FR"/>
               <a:t>Cinquième niveau</a:t>
             </a:r>
-            <a:endParaRPr lang="fr-FR"/>
           </a:p>
         </p:txBody>
       </p:sp>
@@ -861,10 +858,9 @@
           </a:lstStyle>
           <a:p>
             <a:r>
-              <a:rPr lang="fr-FR" smtClean="0"/>
+              <a:rPr lang="fr-FR"/>
               <a:t>Modifiez le style du titre</a:t>
             </a:r>
-            <a:endParaRPr lang="fr-FR"/>
           </a:p>
         </p:txBody>
       </p:sp>
@@ -981,7 +977,7 @@
           <a:p>
             <a:pPr lvl="0"/>
             <a:r>
-              <a:rPr lang="fr-FR" smtClean="0"/>
+              <a:rPr lang="fr-FR"/>
               <a:t>Modifier les styles du texte du masque</a:t>
             </a:r>
           </a:p>
@@ -1098,10 +1094,9 @@
           <a:lstStyle/>
           <a:p>
             <a:r>
-              <a:rPr lang="fr-FR" smtClean="0"/>
+              <a:rPr lang="fr-FR"/>
               <a:t>Modifiez le style du titre</a:t>
             </a:r>
-            <a:endParaRPr lang="fr-FR"/>
           </a:p>
         </p:txBody>
       </p:sp>
@@ -1127,38 +1122,37 @@
           <a:p>
             <a:pPr lvl="0"/>
             <a:r>
-              <a:rPr lang="fr-FR" smtClean="0"/>
+              <a:rPr lang="fr-FR"/>
               <a:t>Modifier les styles du texte du masque</a:t>
             </a:r>
           </a:p>
           <a:p>
             <a:pPr lvl="1"/>
             <a:r>
-              <a:rPr lang="fr-FR" smtClean="0"/>
+              <a:rPr lang="fr-FR"/>
               <a:t>Deuxième niveau</a:t>
             </a:r>
           </a:p>
           <a:p>
             <a:pPr lvl="2"/>
             <a:r>
-              <a:rPr lang="fr-FR" smtClean="0"/>
+              <a:rPr lang="fr-FR"/>
               <a:t>Troisième niveau</a:t>
             </a:r>
           </a:p>
           <a:p>
             <a:pPr lvl="3"/>
             <a:r>
-              <a:rPr lang="fr-FR" smtClean="0"/>
+              <a:rPr lang="fr-FR"/>
               <a:t>Quatrième niveau</a:t>
             </a:r>
           </a:p>
           <a:p>
             <a:pPr lvl="4"/>
             <a:r>
-              <a:rPr lang="fr-FR" smtClean="0"/>
+              <a:rPr lang="fr-FR"/>
               <a:t>Cinquième niveau</a:t>
             </a:r>
-            <a:endParaRPr lang="fr-FR"/>
           </a:p>
         </p:txBody>
       </p:sp>
@@ -1184,38 +1178,37 @@
           <a:p>
             <a:pPr lvl="0"/>
             <a:r>
-              <a:rPr lang="fr-FR" smtClean="0"/>
+              <a:rPr lang="fr-FR"/>
               <a:t>Modifier les styles du texte du masque</a:t>
             </a:r>
           </a:p>
           <a:p>
             <a:pPr lvl="1"/>
             <a:r>
-              <a:rPr lang="fr-FR" smtClean="0"/>
+              <a:rPr lang="fr-FR"/>
               <a:t>Deuxième niveau</a:t>
             </a:r>
           </a:p>
           <a:p>
             <a:pPr lvl="2"/>
             <a:r>
-              <a:rPr lang="fr-FR" smtClean="0"/>
+              <a:rPr lang="fr-FR"/>
               <a:t>Troisième niveau</a:t>
             </a:r>
           </a:p>
           <a:p>
             <a:pPr lvl="3"/>
             <a:r>
-              <a:rPr lang="fr-FR" smtClean="0"/>
+              <a:rPr lang="fr-FR"/>
               <a:t>Quatrième niveau</a:t>
             </a:r>
           </a:p>
           <a:p>
             <a:pPr lvl="4"/>
             <a:r>
-              <a:rPr lang="fr-FR" smtClean="0"/>
+              <a:rPr lang="fr-FR"/>
               <a:t>Cinquième niveau</a:t>
             </a:r>
-            <a:endParaRPr lang="fr-FR"/>
           </a:p>
         </p:txBody>
       </p:sp>
@@ -1335,10 +1328,9 @@
           <a:lstStyle/>
           <a:p>
             <a:r>
-              <a:rPr lang="fr-FR" smtClean="0"/>
+              <a:rPr lang="fr-FR"/>
               <a:t>Modifiez le style du titre</a:t>
             </a:r>
-            <a:endParaRPr lang="fr-FR"/>
           </a:p>
         </p:txBody>
       </p:sp>
@@ -1401,7 +1393,7 @@
           <a:p>
             <a:pPr lvl="0"/>
             <a:r>
-              <a:rPr lang="fr-FR" smtClean="0"/>
+              <a:rPr lang="fr-FR"/>
               <a:t>Modifier les styles du texte du masque</a:t>
             </a:r>
           </a:p>
@@ -1429,38 +1421,37 @@
           <a:p>
             <a:pPr lvl="0"/>
             <a:r>
-              <a:rPr lang="fr-FR" smtClean="0"/>
+              <a:rPr lang="fr-FR"/>
               <a:t>Modifier les styles du texte du masque</a:t>
             </a:r>
           </a:p>
           <a:p>
             <a:pPr lvl="1"/>
             <a:r>
-              <a:rPr lang="fr-FR" smtClean="0"/>
+              <a:rPr lang="fr-FR"/>
               <a:t>Deuxième niveau</a:t>
             </a:r>
           </a:p>
           <a:p>
             <a:pPr lvl="2"/>
             <a:r>
-              <a:rPr lang="fr-FR" smtClean="0"/>
+              <a:rPr lang="fr-FR"/>
               <a:t>Troisième niveau</a:t>
             </a:r>
           </a:p>
           <a:p>
             <a:pPr lvl="3"/>
             <a:r>
-              <a:rPr lang="fr-FR" smtClean="0"/>
+              <a:rPr lang="fr-FR"/>
               <a:t>Quatrième niveau</a:t>
             </a:r>
           </a:p>
           <a:p>
             <a:pPr lvl="4"/>
             <a:r>
-              <a:rPr lang="fr-FR" smtClean="0"/>
+              <a:rPr lang="fr-FR"/>
               <a:t>Cinquième niveau</a:t>
             </a:r>
-            <a:endParaRPr lang="fr-FR"/>
           </a:p>
         </p:txBody>
       </p:sp>
@@ -1523,7 +1514,7 @@
           <a:p>
             <a:pPr lvl="0"/>
             <a:r>
-              <a:rPr lang="fr-FR" smtClean="0"/>
+              <a:rPr lang="fr-FR"/>
               <a:t>Modifier les styles du texte du masque</a:t>
             </a:r>
           </a:p>
@@ -1551,38 +1542,37 @@
           <a:p>
             <a:pPr lvl="0"/>
             <a:r>
-              <a:rPr lang="fr-FR" smtClean="0"/>
+              <a:rPr lang="fr-FR"/>
               <a:t>Modifier les styles du texte du masque</a:t>
             </a:r>
           </a:p>
           <a:p>
             <a:pPr lvl="1"/>
             <a:r>
-              <a:rPr lang="fr-FR" smtClean="0"/>
+              <a:rPr lang="fr-FR"/>
               <a:t>Deuxième niveau</a:t>
             </a:r>
           </a:p>
           <a:p>
             <a:pPr lvl="2"/>
             <a:r>
-              <a:rPr lang="fr-FR" smtClean="0"/>
+              <a:rPr lang="fr-FR"/>
               <a:t>Troisième niveau</a:t>
             </a:r>
           </a:p>
           <a:p>
             <a:pPr lvl="3"/>
             <a:r>
-              <a:rPr lang="fr-FR" smtClean="0"/>
+              <a:rPr lang="fr-FR"/>
               <a:t>Quatrième niveau</a:t>
             </a:r>
           </a:p>
           <a:p>
             <a:pPr lvl="4"/>
             <a:r>
-              <a:rPr lang="fr-FR" smtClean="0"/>
+              <a:rPr lang="fr-FR"/>
               <a:t>Cinquième niveau</a:t>
             </a:r>
-            <a:endParaRPr lang="fr-FR"/>
           </a:p>
         </p:txBody>
       </p:sp>
@@ -1697,10 +1687,9 @@
           <a:lstStyle/>
           <a:p>
             <a:r>
-              <a:rPr lang="fr-FR" smtClean="0"/>
+              <a:rPr lang="fr-FR"/>
               <a:t>Modifiez le style du titre</a:t>
             </a:r>
-            <a:endParaRPr lang="fr-FR"/>
           </a:p>
         </p:txBody>
       </p:sp>
@@ -1919,10 +1908,9 @@
           </a:lstStyle>
           <a:p>
             <a:r>
-              <a:rPr lang="fr-FR" smtClean="0"/>
+              <a:rPr lang="fr-FR"/>
               <a:t>Modifiez le style du titre</a:t>
             </a:r>
-            <a:endParaRPr lang="fr-FR"/>
           </a:p>
         </p:txBody>
       </p:sp>
@@ -1976,38 +1964,37 @@
           <a:p>
             <a:pPr lvl="0"/>
             <a:r>
-              <a:rPr lang="fr-FR" smtClean="0"/>
+              <a:rPr lang="fr-FR"/>
               <a:t>Modifier les styles du texte du masque</a:t>
             </a:r>
           </a:p>
           <a:p>
             <a:pPr lvl="1"/>
             <a:r>
-              <a:rPr lang="fr-FR" smtClean="0"/>
+              <a:rPr lang="fr-FR"/>
               <a:t>Deuxième niveau</a:t>
             </a:r>
           </a:p>
           <a:p>
             <a:pPr lvl="2"/>
             <a:r>
-              <a:rPr lang="fr-FR" smtClean="0"/>
+              <a:rPr lang="fr-FR"/>
               <a:t>Troisième niveau</a:t>
             </a:r>
           </a:p>
           <a:p>
             <a:pPr lvl="3"/>
             <a:r>
-              <a:rPr lang="fr-FR" smtClean="0"/>
+              <a:rPr lang="fr-FR"/>
               <a:t>Quatrième niveau</a:t>
             </a:r>
           </a:p>
           <a:p>
             <a:pPr lvl="4"/>
             <a:r>
-              <a:rPr lang="fr-FR" smtClean="0"/>
+              <a:rPr lang="fr-FR"/>
               <a:t>Cinquième niveau</a:t>
             </a:r>
-            <a:endParaRPr lang="fr-FR"/>
           </a:p>
         </p:txBody>
       </p:sp>
@@ -2070,7 +2057,7 @@
           <a:p>
             <a:pPr lvl="0"/>
             <a:r>
-              <a:rPr lang="fr-FR" smtClean="0"/>
+              <a:rPr lang="fr-FR"/>
               <a:t>Modifier les styles du texte du masque</a:t>
             </a:r>
           </a:p>
@@ -2196,10 +2183,9 @@
           </a:lstStyle>
           <a:p>
             <a:r>
-              <a:rPr lang="fr-FR" smtClean="0"/>
+              <a:rPr lang="fr-FR"/>
               <a:t>Modifiez le style du titre</a:t>
             </a:r>
-            <a:endParaRPr lang="fr-FR"/>
           </a:p>
         </p:txBody>
       </p:sp>
@@ -2323,7 +2309,7 @@
           <a:p>
             <a:pPr lvl="0"/>
             <a:r>
-              <a:rPr lang="fr-FR" smtClean="0"/>
+              <a:rPr lang="fr-FR"/>
               <a:t>Modifier les styles du texte du masque</a:t>
             </a:r>
           </a:p>
@@ -2455,10 +2441,9 @@
           <a:lstStyle/>
           <a:p>
             <a:r>
-              <a:rPr lang="fr-FR" smtClean="0"/>
+              <a:rPr lang="fr-FR"/>
               <a:t>Modifiez le style du titre</a:t>
             </a:r>
-            <a:endParaRPr lang="fr-FR"/>
           </a:p>
         </p:txBody>
       </p:sp>
@@ -2489,38 +2474,37 @@
           <a:p>
             <a:pPr lvl="0"/>
             <a:r>
-              <a:rPr lang="fr-FR" smtClean="0"/>
+              <a:rPr lang="fr-FR"/>
               <a:t>Modifier les styles du texte du masque</a:t>
             </a:r>
           </a:p>
           <a:p>
             <a:pPr lvl="1"/>
             <a:r>
-              <a:rPr lang="fr-FR" smtClean="0"/>
+              <a:rPr lang="fr-FR"/>
               <a:t>Deuxième niveau</a:t>
             </a:r>
           </a:p>
           <a:p>
             <a:pPr lvl="2"/>
             <a:r>
-              <a:rPr lang="fr-FR" smtClean="0"/>
+              <a:rPr lang="fr-FR"/>
               <a:t>Troisième niveau</a:t>
             </a:r>
           </a:p>
           <a:p>
             <a:pPr lvl="3"/>
             <a:r>
-              <a:rPr lang="fr-FR" smtClean="0"/>
+              <a:rPr lang="fr-FR"/>
               <a:t>Quatrième niveau</a:t>
             </a:r>
           </a:p>
           <a:p>
             <a:pPr lvl="4"/>
             <a:r>
-              <a:rPr lang="fr-FR" smtClean="0"/>
+              <a:rPr lang="fr-FR"/>
               <a:t>Cinquième niveau</a:t>
             </a:r>
-            <a:endParaRPr lang="fr-FR"/>
           </a:p>
         </p:txBody>
       </p:sp>
@@ -3508,6 +3492,58 @@
           </a:p>
         </p:txBody>
       </p:sp>
+      <p:sp>
+        <p:nvSpPr>
+          <p:cNvPr id="2" name="Ellipse 1">
+            <a:extLst>
+              <a:ext uri="{FF2B5EF4-FFF2-40B4-BE49-F238E27FC236}">
+                <a16:creationId xmlns:a16="http://schemas.microsoft.com/office/drawing/2014/main" id="{54D138B1-CAE2-66A6-DFD5-AD2247CE7730}"/>
+              </a:ext>
+            </a:extLst>
+          </p:cNvPr>
+          <p:cNvSpPr/>
+          <p:nvPr/>
+        </p:nvSpPr>
+        <p:spPr>
+          <a:xfrm>
+            <a:off x="5879162" y="758799"/>
+            <a:ext cx="4680000" cy="4680000"/>
+          </a:xfrm>
+          <a:prstGeom prst="ellipse">
+            <a:avLst/>
+          </a:prstGeom>
+          <a:solidFill>
+            <a:schemeClr val="bg1"/>
+          </a:solidFill>
+          <a:ln>
+            <a:noFill/>
+          </a:ln>
+        </p:spPr>
+        <p:style>
+          <a:lnRef idx="2">
+            <a:schemeClr val="dk1">
+              <a:shade val="50000"/>
+            </a:schemeClr>
+          </a:lnRef>
+          <a:fillRef idx="1">
+            <a:schemeClr val="dk1"/>
+          </a:fillRef>
+          <a:effectRef idx="0">
+            <a:schemeClr val="dk1"/>
+          </a:effectRef>
+          <a:fontRef idx="minor">
+            <a:schemeClr val="lt1"/>
+          </a:fontRef>
+        </p:style>
+        <p:txBody>
+          <a:bodyPr rtlCol="0" anchor="ctr"/>
+          <a:lstStyle/>
+          <a:p>
+            <a:pPr algn="ctr"/>
+            <a:endParaRPr lang="fr-FR"/>
+          </a:p>
+        </p:txBody>
+      </p:sp>
     </p:spTree>
     <p:extLst>
       <p:ext uri="{BB962C8B-B14F-4D97-AF65-F5344CB8AC3E}">

</xml_diff>